<commit_message>
databinding (includes clrtype and pyevent), unittest, bitmap, and all gestalt demos
</commit_message>
<xml_diff>
--- a/slides/jimmysch-python-in-the-browser.pptx
+++ b/slides/jimmysch-python-in-the-browser.pptx
@@ -2537,14 +2537,35 @@
         </dgm:presLayoutVars>
       </dgm:prSet>
       <dgm:spPr/>
+      <dgm:t>
+        <a:bodyPr/>
+        <a:lstStyle/>
+        <a:p>
+          <a:endParaRPr lang="en-US"/>
+        </a:p>
+      </dgm:t>
     </dgm:pt>
     <dgm:pt modelId="{9542C573-2509-4AA7-B655-E0BA8C77691F}" type="pres">
       <dgm:prSet presAssocID="{22F75463-1C08-4196-A0B3-9FE8EB849B69}" presName="sibTrans" presStyleLbl="sibTrans2D1" presStyleIdx="0" presStyleCnt="3"/>
       <dgm:spPr/>
+      <dgm:t>
+        <a:bodyPr/>
+        <a:lstStyle/>
+        <a:p>
+          <a:endParaRPr lang="en-US"/>
+        </a:p>
+      </dgm:t>
     </dgm:pt>
     <dgm:pt modelId="{72E84E1C-F3E6-4D82-B34C-A03CEB722F38}" type="pres">
       <dgm:prSet presAssocID="{22F75463-1C08-4196-A0B3-9FE8EB849B69}" presName="connectorText" presStyleLbl="sibTrans2D1" presStyleIdx="0" presStyleCnt="3"/>
       <dgm:spPr/>
+      <dgm:t>
+        <a:bodyPr/>
+        <a:lstStyle/>
+        <a:p>
+          <a:endParaRPr lang="en-US"/>
+        </a:p>
+      </dgm:t>
     </dgm:pt>
     <dgm:pt modelId="{3632146D-1CBB-41ED-830E-DA8200C582F7}" type="pres">
       <dgm:prSet presAssocID="{80FCAAA5-6584-452C-AE76-B2C491035230}" presName="node" presStyleLbl="node1" presStyleIdx="1" presStyleCnt="4" custLinFactNeighborY="23577">
@@ -2553,14 +2574,35 @@
         </dgm:presLayoutVars>
       </dgm:prSet>
       <dgm:spPr/>
+      <dgm:t>
+        <a:bodyPr/>
+        <a:lstStyle/>
+        <a:p>
+          <a:endParaRPr lang="en-US"/>
+        </a:p>
+      </dgm:t>
     </dgm:pt>
     <dgm:pt modelId="{1B66F28D-2CB9-4E19-AA27-1AC430178F22}" type="pres">
       <dgm:prSet presAssocID="{F014DB21-050F-47DA-AD65-441761D39CD9}" presName="sibTrans" presStyleLbl="sibTrans2D1" presStyleIdx="1" presStyleCnt="3"/>
       <dgm:spPr/>
+      <dgm:t>
+        <a:bodyPr/>
+        <a:lstStyle/>
+        <a:p>
+          <a:endParaRPr lang="en-US"/>
+        </a:p>
+      </dgm:t>
     </dgm:pt>
     <dgm:pt modelId="{4ADA44A1-C73C-4E12-8801-961E6E07A16A}" type="pres">
       <dgm:prSet presAssocID="{F014DB21-050F-47DA-AD65-441761D39CD9}" presName="connectorText" presStyleLbl="sibTrans2D1" presStyleIdx="1" presStyleCnt="3"/>
       <dgm:spPr/>
+      <dgm:t>
+        <a:bodyPr/>
+        <a:lstStyle/>
+        <a:p>
+          <a:endParaRPr lang="en-US"/>
+        </a:p>
+      </dgm:t>
     </dgm:pt>
     <dgm:pt modelId="{947FD3A8-9B13-4D22-ACF1-DB2A76727F08}" type="pres">
       <dgm:prSet presAssocID="{82F8AE4E-E389-4F02-A28F-73B093F400B9}" presName="node" presStyleLbl="node1" presStyleIdx="2" presStyleCnt="4" custLinFactNeighborY="23577">
@@ -2569,14 +2611,35 @@
         </dgm:presLayoutVars>
       </dgm:prSet>
       <dgm:spPr/>
+      <dgm:t>
+        <a:bodyPr/>
+        <a:lstStyle/>
+        <a:p>
+          <a:endParaRPr lang="en-US"/>
+        </a:p>
+      </dgm:t>
     </dgm:pt>
     <dgm:pt modelId="{20D7AA37-B440-4AA3-840F-05F3E9A4C4F6}" type="pres">
       <dgm:prSet presAssocID="{EF0E8185-96A7-4738-89FC-C4CD990F3866}" presName="sibTrans" presStyleLbl="sibTrans2D1" presStyleIdx="2" presStyleCnt="3"/>
       <dgm:spPr/>
+      <dgm:t>
+        <a:bodyPr/>
+        <a:lstStyle/>
+        <a:p>
+          <a:endParaRPr lang="en-US"/>
+        </a:p>
+      </dgm:t>
     </dgm:pt>
     <dgm:pt modelId="{E7A85F22-232F-4F33-ACDA-0BC9B0636FEC}" type="pres">
       <dgm:prSet presAssocID="{EF0E8185-96A7-4738-89FC-C4CD990F3866}" presName="connectorText" presStyleLbl="sibTrans2D1" presStyleIdx="2" presStyleCnt="3"/>
       <dgm:spPr/>
+      <dgm:t>
+        <a:bodyPr/>
+        <a:lstStyle/>
+        <a:p>
+          <a:endParaRPr lang="en-US"/>
+        </a:p>
+      </dgm:t>
     </dgm:pt>
     <dgm:pt modelId="{6FD582D2-5FBD-40B3-B520-31A74B83154F}" type="pres">
       <dgm:prSet presAssocID="{4BF3C643-3D18-4030-AB1F-4B1D83BEF6DD}" presName="node" presStyleLbl="node1" presStyleIdx="3" presStyleCnt="4" custLinFactNeighborY="-23576">
@@ -2606,8 +2669,8 @@
     <dgm:cxn modelId="{85E7E843-0C60-43D3-83D7-671D9A8832DA}" type="presOf" srcId="{EF0E8185-96A7-4738-89FC-C4CD990F3866}" destId="{E7A85F22-232F-4F33-ACDA-0BC9B0636FEC}" srcOrd="1" destOrd="0" presId="urn:microsoft.com/office/officeart/2005/8/layout/process1"/>
     <dgm:cxn modelId="{14AF3414-732F-410F-9BDE-9B0238820E34}" type="presOf" srcId="{82F8AE4E-E389-4F02-A28F-73B093F400B9}" destId="{947FD3A8-9B13-4D22-ACF1-DB2A76727F08}" srcOrd="0" destOrd="0" presId="urn:microsoft.com/office/officeart/2005/8/layout/process1"/>
     <dgm:cxn modelId="{1C0857DF-97FE-46B9-A320-EA7D0CD85D14}" srcId="{94B1DEF6-6FF3-4B4E-A2E6-5D8B4EDE235F}" destId="{80FCAAA5-6584-452C-AE76-B2C491035230}" srcOrd="1" destOrd="0" parTransId="{6F88648C-1589-41CE-93A9-561A5ED083B7}" sibTransId="{F014DB21-050F-47DA-AD65-441761D39CD9}"/>
+    <dgm:cxn modelId="{F846BC0A-611F-4350-9424-8733A10C9CF6}" srcId="{94B1DEF6-6FF3-4B4E-A2E6-5D8B4EDE235F}" destId="{82F8AE4E-E389-4F02-A28F-73B093F400B9}" srcOrd="2" destOrd="0" parTransId="{D20CE156-B10D-4598-B9B3-7F2BD93D8837}" sibTransId="{EF0E8185-96A7-4738-89FC-C4CD990F3866}"/>
     <dgm:cxn modelId="{4832CF0A-F2D9-4CA6-A594-6BCE19CEFB82}" type="presOf" srcId="{94B1DEF6-6FF3-4B4E-A2E6-5D8B4EDE235F}" destId="{32EFD77E-83D8-42BC-9EB8-22B5458F1883}" srcOrd="0" destOrd="0" presId="urn:microsoft.com/office/officeart/2005/8/layout/process1"/>
-    <dgm:cxn modelId="{F846BC0A-611F-4350-9424-8733A10C9CF6}" srcId="{94B1DEF6-6FF3-4B4E-A2E6-5D8B4EDE235F}" destId="{82F8AE4E-E389-4F02-A28F-73B093F400B9}" srcOrd="2" destOrd="0" parTransId="{D20CE156-B10D-4598-B9B3-7F2BD93D8837}" sibTransId="{EF0E8185-96A7-4738-89FC-C4CD990F3866}"/>
     <dgm:cxn modelId="{2F17EFF4-0869-4A53-8DF8-781A296ECC46}" type="presOf" srcId="{80FCAAA5-6584-452C-AE76-B2C491035230}" destId="{3632146D-1CBB-41ED-830E-DA8200C582F7}" srcOrd="0" destOrd="0" presId="urn:microsoft.com/office/officeart/2005/8/layout/process1"/>
     <dgm:cxn modelId="{671E67DC-ED2E-463C-BE14-A4278D5DBC78}" type="presOf" srcId="{22F75463-1C08-4196-A0B3-9FE8EB849B69}" destId="{9542C573-2509-4AA7-B655-E0BA8C77691F}" srcOrd="0" destOrd="0" presId="urn:microsoft.com/office/officeart/2005/8/layout/process1"/>
     <dgm:cxn modelId="{4B5A9EC3-71C5-45A4-ABC7-A3E7AFC1EDAA}" type="presParOf" srcId="{32EFD77E-83D8-42BC-9EB8-22B5458F1883}" destId="{9529C222-B837-4207-83D0-A5A2BF6D458E}" srcOrd="0" destOrd="0" presId="urn:microsoft.com/office/officeart/2005/8/layout/process1"/>
@@ -2802,14 +2865,35 @@
         </dgm:presLayoutVars>
       </dgm:prSet>
       <dgm:spPr/>
+      <dgm:t>
+        <a:bodyPr/>
+        <a:lstStyle/>
+        <a:p>
+          <a:endParaRPr lang="en-US"/>
+        </a:p>
+      </dgm:t>
     </dgm:pt>
     <dgm:pt modelId="{9542C573-2509-4AA7-B655-E0BA8C77691F}" type="pres">
       <dgm:prSet presAssocID="{22F75463-1C08-4196-A0B3-9FE8EB849B69}" presName="sibTrans" presStyleLbl="sibTrans2D1" presStyleIdx="0" presStyleCnt="3"/>
       <dgm:spPr/>
+      <dgm:t>
+        <a:bodyPr/>
+        <a:lstStyle/>
+        <a:p>
+          <a:endParaRPr lang="en-US"/>
+        </a:p>
+      </dgm:t>
     </dgm:pt>
     <dgm:pt modelId="{72E84E1C-F3E6-4D82-B34C-A03CEB722F38}" type="pres">
       <dgm:prSet presAssocID="{22F75463-1C08-4196-A0B3-9FE8EB849B69}" presName="connectorText" presStyleLbl="sibTrans2D1" presStyleIdx="0" presStyleCnt="3"/>
       <dgm:spPr/>
+      <dgm:t>
+        <a:bodyPr/>
+        <a:lstStyle/>
+        <a:p>
+          <a:endParaRPr lang="en-US"/>
+        </a:p>
+      </dgm:t>
     </dgm:pt>
     <dgm:pt modelId="{3632146D-1CBB-41ED-830E-DA8200C582F7}" type="pres">
       <dgm:prSet presAssocID="{80FCAAA5-6584-452C-AE76-B2C491035230}" presName="node" presStyleLbl="node1" presStyleIdx="1" presStyleCnt="4" custLinFactNeighborY="23577">
@@ -2818,14 +2902,35 @@
         </dgm:presLayoutVars>
       </dgm:prSet>
       <dgm:spPr/>
+      <dgm:t>
+        <a:bodyPr/>
+        <a:lstStyle/>
+        <a:p>
+          <a:endParaRPr lang="en-US"/>
+        </a:p>
+      </dgm:t>
     </dgm:pt>
     <dgm:pt modelId="{1B66F28D-2CB9-4E19-AA27-1AC430178F22}" type="pres">
       <dgm:prSet presAssocID="{F014DB21-050F-47DA-AD65-441761D39CD9}" presName="sibTrans" presStyleLbl="sibTrans2D1" presStyleIdx="1" presStyleCnt="3"/>
       <dgm:spPr/>
+      <dgm:t>
+        <a:bodyPr/>
+        <a:lstStyle/>
+        <a:p>
+          <a:endParaRPr lang="en-US"/>
+        </a:p>
+      </dgm:t>
     </dgm:pt>
     <dgm:pt modelId="{4ADA44A1-C73C-4E12-8801-961E6E07A16A}" type="pres">
       <dgm:prSet presAssocID="{F014DB21-050F-47DA-AD65-441761D39CD9}" presName="connectorText" presStyleLbl="sibTrans2D1" presStyleIdx="1" presStyleCnt="3"/>
       <dgm:spPr/>
+      <dgm:t>
+        <a:bodyPr/>
+        <a:lstStyle/>
+        <a:p>
+          <a:endParaRPr lang="en-US"/>
+        </a:p>
+      </dgm:t>
     </dgm:pt>
     <dgm:pt modelId="{947FD3A8-9B13-4D22-ACF1-DB2A76727F08}" type="pres">
       <dgm:prSet presAssocID="{82F8AE4E-E389-4F02-A28F-73B093F400B9}" presName="node" presStyleLbl="node1" presStyleIdx="2" presStyleCnt="4" custLinFactNeighborY="23577">
@@ -2834,14 +2939,35 @@
         </dgm:presLayoutVars>
       </dgm:prSet>
       <dgm:spPr/>
+      <dgm:t>
+        <a:bodyPr/>
+        <a:lstStyle/>
+        <a:p>
+          <a:endParaRPr lang="en-US"/>
+        </a:p>
+      </dgm:t>
     </dgm:pt>
     <dgm:pt modelId="{20D7AA37-B440-4AA3-840F-05F3E9A4C4F6}" type="pres">
       <dgm:prSet presAssocID="{EF0E8185-96A7-4738-89FC-C4CD990F3866}" presName="sibTrans" presStyleLbl="sibTrans2D1" presStyleIdx="2" presStyleCnt="3"/>
       <dgm:spPr/>
+      <dgm:t>
+        <a:bodyPr/>
+        <a:lstStyle/>
+        <a:p>
+          <a:endParaRPr lang="en-US"/>
+        </a:p>
+      </dgm:t>
     </dgm:pt>
     <dgm:pt modelId="{E7A85F22-232F-4F33-ACDA-0BC9B0636FEC}" type="pres">
       <dgm:prSet presAssocID="{EF0E8185-96A7-4738-89FC-C4CD990F3866}" presName="connectorText" presStyleLbl="sibTrans2D1" presStyleIdx="2" presStyleCnt="3"/>
       <dgm:spPr/>
+      <dgm:t>
+        <a:bodyPr/>
+        <a:lstStyle/>
+        <a:p>
+          <a:endParaRPr lang="en-US"/>
+        </a:p>
+      </dgm:t>
     </dgm:pt>
     <dgm:pt modelId="{6FD582D2-5FBD-40B3-B520-31A74B83154F}" type="pres">
       <dgm:prSet presAssocID="{4BF3C643-3D18-4030-AB1F-4B1D83BEF6DD}" presName="node" presStyleLbl="node1" presStyleIdx="3" presStyleCnt="4" custLinFactNeighborY="-23576">
@@ -2866,8 +2992,8 @@
     <dgm:cxn modelId="{B8249B0C-42B4-4216-977B-176692A3E766}" type="presOf" srcId="{EF0E8185-96A7-4738-89FC-C4CD990F3866}" destId="{20D7AA37-B440-4AA3-840F-05F3E9A4C4F6}" srcOrd="0" destOrd="0" presId="urn:microsoft.com/office/officeart/2005/8/layout/process1"/>
     <dgm:cxn modelId="{D0530799-17FB-4606-9D00-4F8E2E4EC5E9}" srcId="{94B1DEF6-6FF3-4B4E-A2E6-5D8B4EDE235F}" destId="{145401A5-AE87-43B7-AC65-3AC00385A078}" srcOrd="0" destOrd="0" parTransId="{98A7A87D-426F-4D81-A137-DA62AD14F6AF}" sibTransId="{22F75463-1C08-4196-A0B3-9FE8EB849B69}"/>
     <dgm:cxn modelId="{4326C4BA-0BC1-479F-85E0-A60395E57E3C}" type="presOf" srcId="{EF0E8185-96A7-4738-89FC-C4CD990F3866}" destId="{E7A85F22-232F-4F33-ACDA-0BC9B0636FEC}" srcOrd="1" destOrd="0" presId="urn:microsoft.com/office/officeart/2005/8/layout/process1"/>
+    <dgm:cxn modelId="{81BFEDF3-B6BD-474D-8D9E-F0C5D7C4C053}" type="presOf" srcId="{4BF3C643-3D18-4030-AB1F-4B1D83BEF6DD}" destId="{6FD582D2-5FBD-40B3-B520-31A74B83154F}" srcOrd="0" destOrd="0" presId="urn:microsoft.com/office/officeart/2005/8/layout/process1"/>
     <dgm:cxn modelId="{06CF8ED1-8102-4C67-A120-36E1065AC1BD}" srcId="{94B1DEF6-6FF3-4B4E-A2E6-5D8B4EDE235F}" destId="{4BF3C643-3D18-4030-AB1F-4B1D83BEF6DD}" srcOrd="3" destOrd="0" parTransId="{0AD7210E-7024-4E3C-B941-5314F882A789}" sibTransId="{2FA1DF4A-E9F7-4AEC-A1A5-745A60914600}"/>
-    <dgm:cxn modelId="{81BFEDF3-B6BD-474D-8D9E-F0C5D7C4C053}" type="presOf" srcId="{4BF3C643-3D18-4030-AB1F-4B1D83BEF6DD}" destId="{6FD582D2-5FBD-40B3-B520-31A74B83154F}" srcOrd="0" destOrd="0" presId="urn:microsoft.com/office/officeart/2005/8/layout/process1"/>
     <dgm:cxn modelId="{F1EE9229-0278-4C40-B800-3DB9EC737D09}" type="presOf" srcId="{F014DB21-050F-47DA-AD65-441761D39CD9}" destId="{4ADA44A1-C73C-4E12-8801-961E6E07A16A}" srcOrd="1" destOrd="0" presId="urn:microsoft.com/office/officeart/2005/8/layout/process1"/>
     <dgm:cxn modelId="{A5DBD06E-93B4-4D14-B33B-01B34E7FD808}" type="presOf" srcId="{82F8AE4E-E389-4F02-A28F-73B093F400B9}" destId="{947FD3A8-9B13-4D22-ACF1-DB2A76727F08}" srcOrd="0" destOrd="0" presId="urn:microsoft.com/office/officeart/2005/8/layout/process1"/>
     <dgm:cxn modelId="{1C0857DF-97FE-46B9-A320-EA7D0CD85D14}" srcId="{94B1DEF6-6FF3-4B4E-A2E6-5D8B4EDE235F}" destId="{80FCAAA5-6584-452C-AE76-B2C491035230}" srcOrd="1" destOrd="0" parTransId="{6F88648C-1589-41CE-93A9-561A5ED083B7}" sibTransId="{F014DB21-050F-47DA-AD65-441761D39CD9}"/>
@@ -3067,14 +3193,35 @@
         </dgm:presLayoutVars>
       </dgm:prSet>
       <dgm:spPr/>
+      <dgm:t>
+        <a:bodyPr/>
+        <a:lstStyle/>
+        <a:p>
+          <a:endParaRPr lang="en-US"/>
+        </a:p>
+      </dgm:t>
     </dgm:pt>
     <dgm:pt modelId="{9542C573-2509-4AA7-B655-E0BA8C77691F}" type="pres">
       <dgm:prSet presAssocID="{22F75463-1C08-4196-A0B3-9FE8EB849B69}" presName="sibTrans" presStyleLbl="sibTrans2D1" presStyleIdx="0" presStyleCnt="3"/>
       <dgm:spPr/>
+      <dgm:t>
+        <a:bodyPr/>
+        <a:lstStyle/>
+        <a:p>
+          <a:endParaRPr lang="en-US"/>
+        </a:p>
+      </dgm:t>
     </dgm:pt>
     <dgm:pt modelId="{72E84E1C-F3E6-4D82-B34C-A03CEB722F38}" type="pres">
       <dgm:prSet presAssocID="{22F75463-1C08-4196-A0B3-9FE8EB849B69}" presName="connectorText" presStyleLbl="sibTrans2D1" presStyleIdx="0" presStyleCnt="3"/>
       <dgm:spPr/>
+      <dgm:t>
+        <a:bodyPr/>
+        <a:lstStyle/>
+        <a:p>
+          <a:endParaRPr lang="en-US"/>
+        </a:p>
+      </dgm:t>
     </dgm:pt>
     <dgm:pt modelId="{3632146D-1CBB-41ED-830E-DA8200C582F7}" type="pres">
       <dgm:prSet presAssocID="{80FCAAA5-6584-452C-AE76-B2C491035230}" presName="node" presStyleLbl="node1" presStyleIdx="1" presStyleCnt="4" custLinFactNeighborY="23577">
@@ -3083,14 +3230,35 @@
         </dgm:presLayoutVars>
       </dgm:prSet>
       <dgm:spPr/>
+      <dgm:t>
+        <a:bodyPr/>
+        <a:lstStyle/>
+        <a:p>
+          <a:endParaRPr lang="en-US"/>
+        </a:p>
+      </dgm:t>
     </dgm:pt>
     <dgm:pt modelId="{1B66F28D-2CB9-4E19-AA27-1AC430178F22}" type="pres">
       <dgm:prSet presAssocID="{F014DB21-050F-47DA-AD65-441761D39CD9}" presName="sibTrans" presStyleLbl="sibTrans2D1" presStyleIdx="1" presStyleCnt="3"/>
       <dgm:spPr/>
+      <dgm:t>
+        <a:bodyPr/>
+        <a:lstStyle/>
+        <a:p>
+          <a:endParaRPr lang="en-US"/>
+        </a:p>
+      </dgm:t>
     </dgm:pt>
     <dgm:pt modelId="{4ADA44A1-C73C-4E12-8801-961E6E07A16A}" type="pres">
       <dgm:prSet presAssocID="{F014DB21-050F-47DA-AD65-441761D39CD9}" presName="connectorText" presStyleLbl="sibTrans2D1" presStyleIdx="1" presStyleCnt="3"/>
       <dgm:spPr/>
+      <dgm:t>
+        <a:bodyPr/>
+        <a:lstStyle/>
+        <a:p>
+          <a:endParaRPr lang="en-US"/>
+        </a:p>
+      </dgm:t>
     </dgm:pt>
     <dgm:pt modelId="{947FD3A8-9B13-4D22-ACF1-DB2A76727F08}" type="pres">
       <dgm:prSet presAssocID="{82F8AE4E-E389-4F02-A28F-73B093F400B9}" presName="node" presStyleLbl="node1" presStyleIdx="2" presStyleCnt="4" custLinFactNeighborY="23577">
@@ -3099,14 +3267,35 @@
         </dgm:presLayoutVars>
       </dgm:prSet>
       <dgm:spPr/>
+      <dgm:t>
+        <a:bodyPr/>
+        <a:lstStyle/>
+        <a:p>
+          <a:endParaRPr lang="en-US"/>
+        </a:p>
+      </dgm:t>
     </dgm:pt>
     <dgm:pt modelId="{20D7AA37-B440-4AA3-840F-05F3E9A4C4F6}" type="pres">
       <dgm:prSet presAssocID="{EF0E8185-96A7-4738-89FC-C4CD990F3866}" presName="sibTrans" presStyleLbl="sibTrans2D1" presStyleIdx="2" presStyleCnt="3"/>
       <dgm:spPr/>
+      <dgm:t>
+        <a:bodyPr/>
+        <a:lstStyle/>
+        <a:p>
+          <a:endParaRPr lang="en-US"/>
+        </a:p>
+      </dgm:t>
     </dgm:pt>
     <dgm:pt modelId="{E7A85F22-232F-4F33-ACDA-0BC9B0636FEC}" type="pres">
       <dgm:prSet presAssocID="{EF0E8185-96A7-4738-89FC-C4CD990F3866}" presName="connectorText" presStyleLbl="sibTrans2D1" presStyleIdx="2" presStyleCnt="3"/>
       <dgm:spPr/>
+      <dgm:t>
+        <a:bodyPr/>
+        <a:lstStyle/>
+        <a:p>
+          <a:endParaRPr lang="en-US"/>
+        </a:p>
+      </dgm:t>
     </dgm:pt>
     <dgm:pt modelId="{6FD582D2-5FBD-40B3-B520-31A74B83154F}" type="pres">
       <dgm:prSet presAssocID="{4BF3C643-3D18-4030-AB1F-4B1D83BEF6DD}" presName="node" presStyleLbl="node1" presStyleIdx="3" presStyleCnt="4" custLinFactNeighborY="-23576">
@@ -8514,7 +8703,7 @@
           <a:p>
             <a:fld id="{18A366AD-B96D-4A37-BF84-A1F32ACF4A0F}" type="datetimeFigureOut">
               <a:rPr lang="en-US" smtClean="0"/>
-              <a:t>2/7/2010</a:t>
+              <a:t>2/17/2010</a:t>
             </a:fld>
             <a:endParaRPr lang="en-US"/>
           </a:p>
@@ -8778,7 +8967,7 @@
           <a:p>
             <a:fld id="{F62B0488-9F90-40E1-BFA0-8839ED26892D}" type="datetimeFigureOut">
               <a:rPr lang="en-US" smtClean="0"/>
-              <a:t>2/7/2010</a:t>
+              <a:t>2/17/2010</a:t>
             </a:fld>
             <a:endParaRPr lang="en-US"/>
           </a:p>
@@ -8955,7 +9144,7 @@
           <a:p>
             <a:fld id="{F62B0488-9F90-40E1-BFA0-8839ED26892D}" type="datetimeFigureOut">
               <a:rPr lang="en-US" smtClean="0"/>
-              <a:t>2/7/2010</a:t>
+              <a:t>2/17/2010</a:t>
             </a:fld>
             <a:endParaRPr lang="en-US"/>
           </a:p>
@@ -9135,7 +9324,7 @@
           <a:p>
             <a:fld id="{F62B0488-9F90-40E1-BFA0-8839ED26892D}" type="datetimeFigureOut">
               <a:rPr lang="en-US" smtClean="0"/>
-              <a:t>2/7/2010</a:t>
+              <a:t>2/17/2010</a:t>
             </a:fld>
             <a:endParaRPr lang="en-US"/>
           </a:p>
@@ -9305,7 +9494,7 @@
           <a:p>
             <a:fld id="{F62B0488-9F90-40E1-BFA0-8839ED26892D}" type="datetimeFigureOut">
               <a:rPr lang="en-US" smtClean="0"/>
-              <a:t>2/7/2010</a:t>
+              <a:t>2/17/2010</a:t>
             </a:fld>
             <a:endParaRPr lang="en-US"/>
           </a:p>
@@ -9564,7 +9753,7 @@
           <a:p>
             <a:fld id="{F62B0488-9F90-40E1-BFA0-8839ED26892D}" type="datetimeFigureOut">
               <a:rPr lang="en-US" smtClean="0"/>
-              <a:t>2/7/2010</a:t>
+              <a:t>2/17/2010</a:t>
             </a:fld>
             <a:endParaRPr lang="en-US"/>
           </a:p>
@@ -9859,7 +10048,7 @@
           <a:p>
             <a:fld id="{F62B0488-9F90-40E1-BFA0-8839ED26892D}" type="datetimeFigureOut">
               <a:rPr lang="en-US" smtClean="0"/>
-              <a:t>2/7/2010</a:t>
+              <a:t>2/17/2010</a:t>
             </a:fld>
             <a:endParaRPr lang="en-US"/>
           </a:p>
@@ -10281,7 +10470,7 @@
           <a:p>
             <a:fld id="{F62B0488-9F90-40E1-BFA0-8839ED26892D}" type="datetimeFigureOut">
               <a:rPr lang="en-US" smtClean="0"/>
-              <a:t>2/7/2010</a:t>
+              <a:t>2/17/2010</a:t>
             </a:fld>
             <a:endParaRPr lang="en-US"/>
           </a:p>
@@ -10399,7 +10588,7 @@
           <a:p>
             <a:fld id="{F62B0488-9F90-40E1-BFA0-8839ED26892D}" type="datetimeFigureOut">
               <a:rPr lang="en-US" smtClean="0"/>
-              <a:t>2/7/2010</a:t>
+              <a:t>2/17/2010</a:t>
             </a:fld>
             <a:endParaRPr lang="en-US"/>
           </a:p>
@@ -10494,7 +10683,7 @@
           <a:p>
             <a:fld id="{F62B0488-9F90-40E1-BFA0-8839ED26892D}" type="datetimeFigureOut">
               <a:rPr lang="en-US" smtClean="0"/>
-              <a:t>2/7/2010</a:t>
+              <a:t>2/17/2010</a:t>
             </a:fld>
             <a:endParaRPr lang="en-US"/>
           </a:p>
@@ -10771,7 +10960,7 @@
           <a:p>
             <a:fld id="{F62B0488-9F90-40E1-BFA0-8839ED26892D}" type="datetimeFigureOut">
               <a:rPr lang="en-US" smtClean="0"/>
-              <a:t>2/7/2010</a:t>
+              <a:t>2/17/2010</a:t>
             </a:fld>
             <a:endParaRPr lang="en-US"/>
           </a:p>
@@ -11024,7 +11213,7 @@
           <a:p>
             <a:fld id="{F62B0488-9F90-40E1-BFA0-8839ED26892D}" type="datetimeFigureOut">
               <a:rPr lang="en-US" smtClean="0"/>
-              <a:t>2/7/2010</a:t>
+              <a:t>2/17/2010</a:t>
             </a:fld>
             <a:endParaRPr lang="en-US"/>
           </a:p>
@@ -11243,7 +11432,7 @@
           <a:p>
             <a:fld id="{F62B0488-9F90-40E1-BFA0-8839ED26892D}" type="datetimeFigureOut">
               <a:rPr lang="en-US" smtClean="0"/>
-              <a:t>2/7/2010</a:t>
+              <a:t>2/17/2010</a:t>
             </a:fld>
             <a:endParaRPr lang="en-US"/>
           </a:p>
@@ -12261,11 +12450,11 @@
   <p:clrMapOvr>
     <a:masterClrMapping/>
   </p:clrMapOvr>
-  <mc:AlternateContent xmlns:mc="http://schemas.openxmlformats.org/markup-compatibility/2006">
-    <mc:Choice xmlns:p14="http://schemas.microsoft.com/office/powerpoint/2010/main" Requires="p14">
+  <mc:AlternateContent xmlns:mc="http://schemas.openxmlformats.org/markup-compatibility/2006" xmlns:p14="http://schemas.microsoft.com/office/powerpoint/2010/main">
+    <mc:Choice Requires="p14">
       <p:transition p14:dur="0" advClick="0" advTm="0"/>
     </mc:Choice>
-    <mc:Fallback>
+    <mc:Fallback xmlns="">
       <p:transition advClick="0" advTm="0"/>
     </mc:Fallback>
   </mc:AlternateContent>
@@ -12419,88 +12608,6 @@
           <a:chExt cx="0" cy="0"/>
         </a:xfrm>
       </p:grpSpPr>
-      <p:pic>
-        <p:nvPicPr>
-          <p:cNvPr id="1026" name="Picture 2" descr="http://docs.google.com/File?id=dcvr9mmg_104f7prh2fk_b"/>
-          <p:cNvPicPr>
-            <a:picLocks noChangeAspect="1" noChangeArrowheads="1"/>
-          </p:cNvPicPr>
-          <p:nvPr/>
-        </p:nvPicPr>
-        <p:blipFill>
-          <a:blip r:embed="rId2">
-            <a:extLst>
-              <a:ext uri="{28A0092B-C50C-407E-A947-70E740481C1C}">
-                <a14:useLocalDpi xmlns:a14="http://schemas.microsoft.com/office/drawing/2010/main" val="0"/>
-              </a:ext>
-            </a:extLst>
-          </a:blip>
-          <a:srcRect/>
-          <a:stretch>
-            <a:fillRect/>
-          </a:stretch>
-        </p:blipFill>
-        <p:spPr bwMode="auto">
-          <a:xfrm>
-            <a:off x="152400" y="2716143"/>
-            <a:ext cx="8810625" cy="1676400"/>
-          </a:xfrm>
-          <a:prstGeom prst="rect">
-            <a:avLst/>
-          </a:prstGeom>
-          <a:noFill/>
-          <a:extLst>
-            <a:ext uri="{909E8E84-426E-40DD-AFC4-6F175D3DCCD1}">
-              <a14:hiddenFill xmlns:a14="http://schemas.microsoft.com/office/drawing/2010/main">
-                <a:solidFill>
-                  <a:srgbClr val="FFFFFF"/>
-                </a:solidFill>
-              </a14:hiddenFill>
-            </a:ext>
-          </a:extLst>
-        </p:spPr>
-      </p:pic>
-      <p:pic>
-        <p:nvPicPr>
-          <p:cNvPr id="1027" name="Picture 3" descr="http://docs.google.com/File?id=dcvr9mmg_105gn2mqpfb_b"/>
-          <p:cNvPicPr>
-            <a:picLocks noChangeAspect="1" noChangeArrowheads="1"/>
-          </p:cNvPicPr>
-          <p:nvPr/>
-        </p:nvPicPr>
-        <p:blipFill>
-          <a:blip r:embed="rId3">
-            <a:extLst>
-              <a:ext uri="{28A0092B-C50C-407E-A947-70E740481C1C}">
-                <a14:useLocalDpi xmlns:a14="http://schemas.microsoft.com/office/drawing/2010/main" val="0"/>
-              </a:ext>
-            </a:extLst>
-          </a:blip>
-          <a:srcRect/>
-          <a:stretch>
-            <a:fillRect/>
-          </a:stretch>
-        </p:blipFill>
-        <p:spPr bwMode="auto">
-          <a:xfrm>
-            <a:off x="167640" y="5506968"/>
-            <a:ext cx="8810625" cy="1171575"/>
-          </a:xfrm>
-          <a:prstGeom prst="rect">
-            <a:avLst/>
-          </a:prstGeom>
-          <a:noFill/>
-          <a:extLst>
-            <a:ext uri="{909E8E84-426E-40DD-AFC4-6F175D3DCCD1}">
-              <a14:hiddenFill xmlns:a14="http://schemas.microsoft.com/office/drawing/2010/main">
-                <a:solidFill>
-                  <a:srgbClr val="FFFFFF"/>
-                </a:solidFill>
-              </a14:hiddenFill>
-            </a:ext>
-          </a:extLst>
-        </p:spPr>
-      </p:pic>
       <p:sp>
         <p:nvSpPr>
           <p:cNvPr id="6" name="Rectangle 5"/>
@@ -12573,7 +12680,39 @@
                   <a:schemeClr val="bg1"/>
                 </a:solidFill>
               </a:rPr>
-              <a:t>First request		~ 1.3 MB</a:t>
+              <a:t>First request		~ </a:t>
+            </a:r>
+            <a:r>
+              <a:rPr lang="en-US" sz="4000" dirty="0" smtClean="0">
+                <a:solidFill>
+                  <a:schemeClr val="bg1"/>
+                </a:solidFill>
+              </a:rPr>
+              <a:t>1</a:t>
+            </a:r>
+            <a:r>
+              <a:rPr lang="en-US" sz="4000" dirty="0" smtClean="0">
+                <a:solidFill>
+                  <a:schemeClr val="bg1"/>
+                </a:solidFill>
+              </a:rPr>
+              <a:t>.5</a:t>
+            </a:r>
+            <a:r>
+              <a:rPr lang="en-US" sz="4000" dirty="0" smtClean="0">
+                <a:solidFill>
+                  <a:schemeClr val="bg1"/>
+                </a:solidFill>
+              </a:rPr>
+              <a:t> </a:t>
+            </a:r>
+            <a:r>
+              <a:rPr lang="en-US" sz="4000" dirty="0" smtClean="0">
+                <a:solidFill>
+                  <a:schemeClr val="bg1"/>
+                </a:solidFill>
+              </a:rPr>
+              <a:t>MB</a:t>
             </a:r>
             <a:endParaRPr lang="en-US" sz="4000" dirty="0">
               <a:solidFill>
@@ -12636,7 +12775,7 @@
         <p:spPr>
           <a:xfrm>
             <a:off x="42486" y="4621143"/>
-            <a:ext cx="5428089" cy="707886"/>
+            <a:ext cx="5168403" cy="707886"/>
           </a:xfrm>
           <a:prstGeom prst="rect">
             <a:avLst/>
@@ -12655,7 +12794,31 @@
                   <a:schemeClr val="bg1"/>
                 </a:solidFill>
               </a:rPr>
-              <a:t>N requests		~ 35 KB</a:t>
+              <a:t>N requests		~ </a:t>
+            </a:r>
+            <a:r>
+              <a:rPr lang="en-US" sz="4000" dirty="0">
+                <a:solidFill>
+                  <a:schemeClr val="bg1"/>
+                </a:solidFill>
+              </a:rPr>
+              <a:t>8</a:t>
+            </a:r>
+            <a:r>
+              <a:rPr lang="en-US" sz="4000" dirty="0" smtClean="0">
+                <a:solidFill>
+                  <a:schemeClr val="bg1"/>
+                </a:solidFill>
+              </a:rPr>
+              <a:t> </a:t>
+            </a:r>
+            <a:r>
+              <a:rPr lang="en-US" sz="4000" dirty="0" smtClean="0">
+                <a:solidFill>
+                  <a:schemeClr val="bg1"/>
+                </a:solidFill>
+              </a:rPr>
+              <a:t>KB</a:t>
             </a:r>
             <a:endParaRPr lang="en-US" sz="4000" dirty="0">
               <a:solidFill>
@@ -12743,6 +12906,66 @@
           </a:p>
         </p:txBody>
       </p:sp>
+      <p:pic>
+        <p:nvPicPr>
+          <p:cNvPr id="2" name="Picture 1"/>
+          <p:cNvPicPr>
+            <a:picLocks noChangeAspect="1"/>
+          </p:cNvPicPr>
+          <p:nvPr/>
+        </p:nvPicPr>
+        <p:blipFill>
+          <a:blip r:embed="rId2">
+            <a:extLst>
+              <a:ext uri="{28A0092B-C50C-407E-A947-70E740481C1C}">
+                <a14:useLocalDpi xmlns:a14="http://schemas.microsoft.com/office/drawing/2010/main" val="0"/>
+              </a:ext>
+            </a:extLst>
+          </a:blip>
+          <a:stretch>
+            <a:fillRect/>
+          </a:stretch>
+        </p:blipFill>
+        <p:spPr>
+          <a:xfrm>
+            <a:off x="187656" y="2667000"/>
+            <a:ext cx="8763000" cy="1824378"/>
+          </a:xfrm>
+          <a:prstGeom prst="rect">
+            <a:avLst/>
+          </a:prstGeom>
+        </p:spPr>
+      </p:pic>
+      <p:pic>
+        <p:nvPicPr>
+          <p:cNvPr id="3" name="Picture 2"/>
+          <p:cNvPicPr>
+            <a:picLocks noChangeAspect="1"/>
+          </p:cNvPicPr>
+          <p:nvPr/>
+        </p:nvPicPr>
+        <p:blipFill>
+          <a:blip r:embed="rId3">
+            <a:extLst>
+              <a:ext uri="{28A0092B-C50C-407E-A947-70E740481C1C}">
+                <a14:useLocalDpi xmlns:a14="http://schemas.microsoft.com/office/drawing/2010/main" val="0"/>
+              </a:ext>
+            </a:extLst>
+          </a:blip>
+          <a:stretch>
+            <a:fillRect/>
+          </a:stretch>
+        </p:blipFill>
+        <p:spPr>
+          <a:xfrm>
+            <a:off x="188792" y="5437496"/>
+            <a:ext cx="8761863" cy="1285871"/>
+          </a:xfrm>
+          <a:prstGeom prst="rect">
+            <a:avLst/>
+          </a:prstGeom>
+        </p:spPr>
+      </p:pic>
     </p:spTree>
     <p:extLst>
       <p:ext uri="{BB962C8B-B14F-4D97-AF65-F5344CB8AC3E}">
@@ -12753,13 +12976,13 @@
   <p:clrMapOvr>
     <a:masterClrMapping/>
   </p:clrMapOvr>
-  <mc:AlternateContent xmlns:mc="http://schemas.openxmlformats.org/markup-compatibility/2006">
-    <mc:Choice xmlns:p14="http://schemas.microsoft.com/office/powerpoint/2010/main" Requires="p14">
+  <mc:AlternateContent xmlns:mc="http://schemas.openxmlformats.org/markup-compatibility/2006" xmlns:p14="http://schemas.microsoft.com/office/powerpoint/2010/main">
+    <mc:Choice Requires="p14">
       <p:transition p14:dur="250" advClick="0">
         <p:fade/>
       </p:transition>
     </mc:Choice>
-    <mc:Fallback>
+    <mc:Fallback xmlns="">
       <p:transition advClick="0">
         <p:fade/>
       </p:transition>
@@ -14170,13 +14393,13 @@
   <p:clrMapOvr>
     <a:masterClrMapping/>
   </p:clrMapOvr>
-  <mc:AlternateContent xmlns:mc="http://schemas.openxmlformats.org/markup-compatibility/2006">
-    <mc:Choice xmlns:p14="http://schemas.microsoft.com/office/powerpoint/2010/main" Requires="p14">
+  <mc:AlternateContent xmlns:mc="http://schemas.openxmlformats.org/markup-compatibility/2006" xmlns:p14="http://schemas.microsoft.com/office/powerpoint/2010/main">
+    <mc:Choice Requires="p14">
       <p:transition>
         <p14:flythrough/>
       </p:transition>
     </mc:Choice>
-    <mc:Fallback>
+    <mc:Fallback xmlns="">
       <p:transition>
         <p:fade/>
       </p:transition>
@@ -14434,13 +14657,13 @@
   <p:clrMapOvr>
     <a:masterClrMapping/>
   </p:clrMapOvr>
-  <mc:AlternateContent xmlns:mc="http://schemas.openxmlformats.org/markup-compatibility/2006">
-    <mc:Choice xmlns:p14="http://schemas.microsoft.com/office/powerpoint/2010/main" Requires="p14">
+  <mc:AlternateContent xmlns:mc="http://schemas.openxmlformats.org/markup-compatibility/2006" xmlns:p14="http://schemas.microsoft.com/office/powerpoint/2010/main">
+    <mc:Choice Requires="p14">
       <p:transition>
         <p14:pan/>
       </p:transition>
     </mc:Choice>
-    <mc:Fallback>
+    <mc:Fallback xmlns="">
       <p:transition>
         <p:fade/>
       </p:transition>
@@ -15940,11 +16163,11 @@
   <p:clrMapOvr>
     <a:masterClrMapping/>
   </p:clrMapOvr>
-  <mc:AlternateContent xmlns:mc="http://schemas.openxmlformats.org/markup-compatibility/2006">
-    <mc:Choice xmlns:p14="http://schemas.microsoft.com/office/powerpoint/2010/main" Requires="p14">
+  <mc:AlternateContent xmlns:mc="http://schemas.openxmlformats.org/markup-compatibility/2006" xmlns:p14="http://schemas.microsoft.com/office/powerpoint/2010/main">
+    <mc:Choice Requires="p14">
       <p:transition p14:dur="0"/>
     </mc:Choice>
-    <mc:Fallback>
+    <mc:Fallback xmlns="">
       <p:transition/>
     </mc:Fallback>
   </mc:AlternateContent>
@@ -16382,13 +16605,6 @@
               </a:rPr>
               <a:t>Downloads languages on-demand</a:t>
             </a:r>
-            <a:endParaRPr lang="en-US" sz="3200" dirty="0" smtClean="0">
-              <a:solidFill>
-                <a:schemeClr val="bg1">
-                  <a:lumMod val="65000"/>
-                </a:schemeClr>
-              </a:solidFill>
-            </a:endParaRPr>
           </a:p>
           <a:p>
             <a:pPr marL="285750" indent="-285750">
@@ -16416,11 +16632,11 @@
   <p:clrMapOvr>
     <a:masterClrMapping/>
   </p:clrMapOvr>
-  <mc:AlternateContent xmlns:mc="http://schemas.openxmlformats.org/markup-compatibility/2006">
-    <mc:Choice xmlns:p14="http://schemas.microsoft.com/office/powerpoint/2010/main" Requires="p14">
+  <mc:AlternateContent xmlns:mc="http://schemas.openxmlformats.org/markup-compatibility/2006" xmlns:p14="http://schemas.microsoft.com/office/powerpoint/2010/main">
+    <mc:Choice Requires="p14">
       <p:transition p14:dur="10"/>
     </mc:Choice>
-    <mc:Fallback>
+    <mc:Fallback xmlns="">
       <p:transition/>
     </mc:Fallback>
   </mc:AlternateContent>
@@ -17024,13 +17240,6 @@
               </a:rPr>
               <a:t>&gt;</a:t>
             </a:r>
-            <a:endParaRPr lang="en-US" sz="2800" dirty="0" smtClean="0">
-              <a:solidFill>
-                <a:schemeClr val="bg1"/>
-              </a:solidFill>
-              <a:latin typeface="Consolas" pitchFamily="49" charset="0"/>
-              <a:cs typeface="Consolas" pitchFamily="49" charset="0"/>
-            </a:endParaRPr>
           </a:p>
           <a:p>
             <a:r>
@@ -17256,11 +17465,11 @@
   <p:clrMapOvr>
     <a:masterClrMapping/>
   </p:clrMapOvr>
-  <mc:AlternateContent xmlns:mc="http://schemas.openxmlformats.org/markup-compatibility/2006">
-    <mc:Choice xmlns:p14="http://schemas.microsoft.com/office/powerpoint/2010/main" Requires="p14">
+  <mc:AlternateContent xmlns:mc="http://schemas.openxmlformats.org/markup-compatibility/2006" xmlns:p14="http://schemas.microsoft.com/office/powerpoint/2010/main">
+    <mc:Choice Requires="p14">
       <p:transition p14:dur="0"/>
     </mc:Choice>
-    <mc:Fallback>
+    <mc:Fallback xmlns="">
       <p:transition/>
     </mc:Fallback>
   </mc:AlternateContent>

</xml_diff>